<commit_message>
Added the updated version of the pptx.
</commit_message>
<xml_diff>
--- a/GraduateRankings.pptx
+++ b/GraduateRankings.pptx
@@ -19,11 +19,11 @@
   <p:notesSz cx="6858000" cy="9144000"/>
   <p:embeddedFontLst>
     <p:embeddedFont>
-      <p:font typeface="Average" panose="02000503040000020003" pitchFamily="2" charset="77"/>
+      <p:font typeface="Average" panose="020B0604020202020204" charset="0"/>
       <p:regular r:id="rId9"/>
     </p:embeddedFont>
     <p:embeddedFont>
-      <p:font typeface="Oswald" pitchFamily="2" charset="77"/>
+      <p:font typeface="Oswald" panose="020B0604020202020204" charset="0"/>
       <p:regular r:id="rId10"/>
       <p:bold r:id="rId11"/>
     </p:embeddedFont>
@@ -6034,15 +6034,15 @@
             </a:pPr>
             <a:r>
               <a:rPr lang="en" dirty="0"/>
-              <a:t>Diane </a:t>
+              <a:t>Diane Scherpereel, Gabriel </a:t>
             </a:r>
             <a:r>
-              <a:rPr lang="en" dirty="0" err="1"/>
-              <a:t>Scherpereel</a:t>
+              <a:rPr lang="en-US" dirty="0"/>
+              <a:t>de Souza Franco</a:t>
             </a:r>
             <a:r>
               <a:rPr lang="en" dirty="0"/>
-              <a:t>, Gabriel, Roger J. </a:t>
+              <a:t>, Roger J. </a:t>
             </a:r>
             <a:r>
               <a:rPr lang="en" dirty="0" err="1"/>

</xml_diff>